<commit_message>
Se ha agregado los elementos faltantes a lo largo del desarrollo del tt2, como las notas de las junta 9, 10, alguna extraordinaria, sobre la presentación. Ademas de agregar las revisiones hechsa por el director en el documento de análsis. Igual se han hecho pequeñas correciones en los capitulso 3 y 5 del mismo docuemnto (ortografia, puntuación, etc.
</commit_message>
<xml_diff>
--- a/Analisis/Recursos/Capitulo5/Entrenamiento.pptx
+++ b/Analisis/Recursos/Capitulo5/Entrenamiento.pptx
@@ -1021,7 +1021,7 @@
             <a:rPr lang="es-ES" sz="3600" b="0" u="none" dirty="0">
               <a:latin typeface="Garamond" panose="02020404030301010803" pitchFamily="18" charset="0"/>
             </a:rPr>
-            <a:t>Recolección de noticias</a:t>
+            <a:t>Recolección</a:t>
           </a:r>
         </a:p>
       </dgm:t>
@@ -1063,7 +1063,7 @@
             <a:rPr lang="es-ES" sz="3600" b="0" u="none" dirty="0">
               <a:latin typeface="Garamond" panose="02020404030301010803" pitchFamily="18" charset="0"/>
             </a:rPr>
-            <a:t>Entrenamiento de clasificador</a:t>
+            <a:t>Entrenamiento</a:t>
           </a:r>
         </a:p>
       </dgm:t>
@@ -1102,13 +1102,16 @@
         <a:lstStyle/>
         <a:p>
           <a:r>
-            <a:rPr lang="es-ES" sz="3600" b="0" u="none" dirty="0">
+            <a:rPr lang="es-ES" sz="3500" b="0" u="none" dirty="0">
               <a:solidFill>
-                <a:schemeClr val="tx1"/>
+                <a:schemeClr val="tx1">
+                  <a:lumMod val="85000"/>
+                  <a:lumOff val="15000"/>
+                </a:schemeClr>
               </a:solidFill>
               <a:latin typeface="Garamond" panose="02020404030301010803" pitchFamily="18" charset="0"/>
             </a:rPr>
-            <a:t>Desarrollo de aplicación web</a:t>
+            <a:t>Aplicación web</a:t>
           </a:r>
         </a:p>
       </dgm:t>
@@ -1375,7 +1378,7 @@
             <a:rPr lang="es-ES" sz="3600" b="0" u="none" kern="1200" dirty="0">
               <a:latin typeface="Garamond" panose="02020404030301010803" pitchFamily="18" charset="0"/>
             </a:rPr>
-            <a:t>Recolección de noticias</a:t>
+            <a:t>Recolección</a:t>
           </a:r>
         </a:p>
       </dsp:txBody>
@@ -1497,7 +1500,7 @@
             <a:rPr lang="es-ES" sz="3600" b="0" u="none" kern="1200" dirty="0">
               <a:latin typeface="Garamond" panose="02020404030301010803" pitchFamily="18" charset="0"/>
             </a:rPr>
-            <a:t>Entrenamiento de clasificador</a:t>
+            <a:t>Entrenamiento</a:t>
           </a:r>
         </a:p>
       </dsp:txBody>
@@ -1598,12 +1601,12 @@
         </a:fontRef>
       </dsp:style>
       <dsp:txBody>
-        <a:bodyPr spcFirstLastPara="0" vert="horz" wrap="square" lIns="256032" tIns="256032" rIns="256032" bIns="256032" numCol="1" spcCol="1270" anchor="ctr" anchorCtr="0">
+        <a:bodyPr spcFirstLastPara="0" vert="horz" wrap="square" lIns="248920" tIns="248920" rIns="248920" bIns="248920" numCol="1" spcCol="1270" anchor="ctr" anchorCtr="0">
           <a:noAutofit/>
         </a:bodyPr>
         <a:lstStyle/>
         <a:p>
-          <a:pPr marL="0" lvl="0" indent="0" algn="ctr" defTabSz="1600200">
+          <a:pPr marL="0" lvl="0" indent="0" algn="ctr" defTabSz="1555750">
             <a:lnSpc>
               <a:spcPct val="90000"/>
             </a:lnSpc>
@@ -1616,13 +1619,16 @@
             <a:buNone/>
           </a:pPr>
           <a:r>
-            <a:rPr lang="es-ES" sz="3600" b="0" u="none" kern="1200" dirty="0">
+            <a:rPr lang="es-ES" sz="3500" b="0" u="none" kern="1200" dirty="0">
               <a:solidFill>
-                <a:schemeClr val="tx1"/>
+                <a:schemeClr val="tx1">
+                  <a:lumMod val="85000"/>
+                  <a:lumOff val="15000"/>
+                </a:schemeClr>
               </a:solidFill>
               <a:latin typeface="Garamond" panose="02020404030301010803" pitchFamily="18" charset="0"/>
             </a:rPr>
-            <a:t>Desarrollo de aplicación web</a:t>
+            <a:t>Aplicación web</a:t>
           </a:r>
         </a:p>
       </dsp:txBody>
@@ -3102,7 +3108,7 @@
           <a:p>
             <a:fld id="{64335DFB-502B-0D44-AC3E-5552C11BB471}" type="datetimeFigureOut">
               <a:rPr lang="es-MX" smtClean="0"/>
-              <a:t>29/10/19</a:t>
+              <a:t>15/11/19</a:t>
             </a:fld>
             <a:endParaRPr lang="es-MX"/>
           </a:p>
@@ -3302,7 +3308,7 @@
           <a:p>
             <a:fld id="{64335DFB-502B-0D44-AC3E-5552C11BB471}" type="datetimeFigureOut">
               <a:rPr lang="es-MX" smtClean="0"/>
-              <a:t>29/10/19</a:t>
+              <a:t>15/11/19</a:t>
             </a:fld>
             <a:endParaRPr lang="es-MX"/>
           </a:p>
@@ -3512,7 +3518,7 @@
           <a:p>
             <a:fld id="{64335DFB-502B-0D44-AC3E-5552C11BB471}" type="datetimeFigureOut">
               <a:rPr lang="es-MX" smtClean="0"/>
-              <a:t>29/10/19</a:t>
+              <a:t>15/11/19</a:t>
             </a:fld>
             <a:endParaRPr lang="es-MX"/>
           </a:p>
@@ -3712,7 +3718,7 @@
           <a:p>
             <a:fld id="{64335DFB-502B-0D44-AC3E-5552C11BB471}" type="datetimeFigureOut">
               <a:rPr lang="es-MX" smtClean="0"/>
-              <a:t>29/10/19</a:t>
+              <a:t>15/11/19</a:t>
             </a:fld>
             <a:endParaRPr lang="es-MX"/>
           </a:p>
@@ -3988,7 +3994,7 @@
           <a:p>
             <a:fld id="{64335DFB-502B-0D44-AC3E-5552C11BB471}" type="datetimeFigureOut">
               <a:rPr lang="es-MX" smtClean="0"/>
-              <a:t>29/10/19</a:t>
+              <a:t>15/11/19</a:t>
             </a:fld>
             <a:endParaRPr lang="es-MX"/>
           </a:p>
@@ -4256,7 +4262,7 @@
           <a:p>
             <a:fld id="{64335DFB-502B-0D44-AC3E-5552C11BB471}" type="datetimeFigureOut">
               <a:rPr lang="es-MX" smtClean="0"/>
-              <a:t>29/10/19</a:t>
+              <a:t>15/11/19</a:t>
             </a:fld>
             <a:endParaRPr lang="es-MX"/>
           </a:p>
@@ -4671,7 +4677,7 @@
           <a:p>
             <a:fld id="{64335DFB-502B-0D44-AC3E-5552C11BB471}" type="datetimeFigureOut">
               <a:rPr lang="es-MX" smtClean="0"/>
-              <a:t>29/10/19</a:t>
+              <a:t>15/11/19</a:t>
             </a:fld>
             <a:endParaRPr lang="es-MX"/>
           </a:p>
@@ -4813,7 +4819,7 @@
           <a:p>
             <a:fld id="{64335DFB-502B-0D44-AC3E-5552C11BB471}" type="datetimeFigureOut">
               <a:rPr lang="es-MX" smtClean="0"/>
-              <a:t>29/10/19</a:t>
+              <a:t>15/11/19</a:t>
             </a:fld>
             <a:endParaRPr lang="es-MX"/>
           </a:p>
@@ -4926,7 +4932,7 @@
           <a:p>
             <a:fld id="{64335DFB-502B-0D44-AC3E-5552C11BB471}" type="datetimeFigureOut">
               <a:rPr lang="es-MX" smtClean="0"/>
-              <a:t>29/10/19</a:t>
+              <a:t>15/11/19</a:t>
             </a:fld>
             <a:endParaRPr lang="es-MX"/>
           </a:p>
@@ -5239,7 +5245,7 @@
           <a:p>
             <a:fld id="{64335DFB-502B-0D44-AC3E-5552C11BB471}" type="datetimeFigureOut">
               <a:rPr lang="es-MX" smtClean="0"/>
-              <a:t>29/10/19</a:t>
+              <a:t>15/11/19</a:t>
             </a:fld>
             <a:endParaRPr lang="es-MX"/>
           </a:p>
@@ -5528,7 +5534,7 @@
           <a:p>
             <a:fld id="{64335DFB-502B-0D44-AC3E-5552C11BB471}" type="datetimeFigureOut">
               <a:rPr lang="es-MX" smtClean="0"/>
-              <a:t>29/10/19</a:t>
+              <a:t>15/11/19</a:t>
             </a:fld>
             <a:endParaRPr lang="es-MX"/>
           </a:p>
@@ -5771,7 +5777,7 @@
           <a:p>
             <a:fld id="{64335DFB-502B-0D44-AC3E-5552C11BB471}" type="datetimeFigureOut">
               <a:rPr lang="es-MX" smtClean="0"/>
-              <a:t>29/10/19</a:t>
+              <a:t>15/11/19</a:t>
             </a:fld>
             <a:endParaRPr lang="es-MX"/>
           </a:p>
@@ -6201,7 +6207,7 @@
           <p:nvPr>
             <p:extLst>
               <p:ext uri="{D42A27DB-BD31-4B8C-83A1-F6EECF244321}">
-                <p14:modId xmlns:p14="http://schemas.microsoft.com/office/powerpoint/2010/main" val="2072511354"/>
+                <p14:modId xmlns:p14="http://schemas.microsoft.com/office/powerpoint/2010/main" val="1809278029"/>
               </p:ext>
             </p:extLst>
           </p:nvPr>
@@ -6264,6 +6270,12 @@
             <a:pPr algn="ctr"/>
             <a:r>
               <a:rPr lang="en-US" sz="4800" dirty="0">
+                <a:solidFill>
+                  <a:schemeClr val="tx1">
+                    <a:lumMod val="85000"/>
+                    <a:lumOff val="15000"/>
+                  </a:schemeClr>
+                </a:solidFill>
                 <a:latin typeface="Garamond" panose="02020404030301010803" pitchFamily="18" charset="0"/>
               </a:rPr>
               <a:t>1</a:t>
@@ -6319,6 +6331,12 @@
             <a:pPr algn="ctr"/>
             <a:r>
               <a:rPr lang="en-US" sz="4800" dirty="0">
+                <a:solidFill>
+                  <a:schemeClr val="tx1">
+                    <a:lumMod val="85000"/>
+                    <a:lumOff val="15000"/>
+                  </a:schemeClr>
+                </a:solidFill>
                 <a:latin typeface="Garamond" panose="02020404030301010803" pitchFamily="18" charset="0"/>
               </a:rPr>
               <a:t>2</a:t>
@@ -6374,6 +6392,12 @@
             <a:pPr algn="ctr"/>
             <a:r>
               <a:rPr lang="en-US" sz="4800" dirty="0">
+                <a:solidFill>
+                  <a:schemeClr val="tx1">
+                    <a:lumMod val="85000"/>
+                    <a:lumOff val="15000"/>
+                  </a:schemeClr>
+                </a:solidFill>
                 <a:latin typeface="Garamond" panose="02020404030301010803" pitchFamily="18" charset="0"/>
               </a:rPr>
               <a:t>3</a:t>

</xml_diff>